<commit_message>
updated ms with kaww
</commit_message>
<xml_diff>
--- a/outputs/forpub/z_old_versions/heatmap_final.pptx
+++ b/outputs/forpub/z_old_versions/heatmap_final.pptx
@@ -6,6 +6,7 @@
   </p:sldMasterIdLst>
   <p:sldIdLst>
     <p:sldId id="256" r:id="rId2"/>
+    <p:sldId id="257" r:id="rId3"/>
   </p:sldIdLst>
   <p:sldSz cx="12192000" cy="6858000"/>
   <p:notesSz cx="6858000" cy="9144000"/>
@@ -259,7 +260,7 @@
           <a:p>
             <a:fld id="{EC310068-050D-EA44-BCC5-73AE705BEFFB}" type="datetimeFigureOut">
               <a:rPr lang="en-US" smtClean="0"/>
-              <a:t>8/18/23</a:t>
+              <a:t>11/10/23</a:t>
             </a:fld>
             <a:endParaRPr lang="en-US"/>
           </a:p>
@@ -457,7 +458,7 @@
           <a:p>
             <a:fld id="{EC310068-050D-EA44-BCC5-73AE705BEFFB}" type="datetimeFigureOut">
               <a:rPr lang="en-US" smtClean="0"/>
-              <a:t>8/18/23</a:t>
+              <a:t>11/10/23</a:t>
             </a:fld>
             <a:endParaRPr lang="en-US"/>
           </a:p>
@@ -665,7 +666,7 @@
           <a:p>
             <a:fld id="{EC310068-050D-EA44-BCC5-73AE705BEFFB}" type="datetimeFigureOut">
               <a:rPr lang="en-US" smtClean="0"/>
-              <a:t>8/18/23</a:t>
+              <a:t>11/10/23</a:t>
             </a:fld>
             <a:endParaRPr lang="en-US"/>
           </a:p>
@@ -863,7 +864,7 @@
           <a:p>
             <a:fld id="{EC310068-050D-EA44-BCC5-73AE705BEFFB}" type="datetimeFigureOut">
               <a:rPr lang="en-US" smtClean="0"/>
-              <a:t>8/18/23</a:t>
+              <a:t>11/10/23</a:t>
             </a:fld>
             <a:endParaRPr lang="en-US"/>
           </a:p>
@@ -1138,7 +1139,7 @@
           <a:p>
             <a:fld id="{EC310068-050D-EA44-BCC5-73AE705BEFFB}" type="datetimeFigureOut">
               <a:rPr lang="en-US" smtClean="0"/>
-              <a:t>8/18/23</a:t>
+              <a:t>11/10/23</a:t>
             </a:fld>
             <a:endParaRPr lang="en-US"/>
           </a:p>
@@ -1403,7 +1404,7 @@
           <a:p>
             <a:fld id="{EC310068-050D-EA44-BCC5-73AE705BEFFB}" type="datetimeFigureOut">
               <a:rPr lang="en-US" smtClean="0"/>
-              <a:t>8/18/23</a:t>
+              <a:t>11/10/23</a:t>
             </a:fld>
             <a:endParaRPr lang="en-US"/>
           </a:p>
@@ -1815,7 +1816,7 @@
           <a:p>
             <a:fld id="{EC310068-050D-EA44-BCC5-73AE705BEFFB}" type="datetimeFigureOut">
               <a:rPr lang="en-US" smtClean="0"/>
-              <a:t>8/18/23</a:t>
+              <a:t>11/10/23</a:t>
             </a:fld>
             <a:endParaRPr lang="en-US"/>
           </a:p>
@@ -1956,7 +1957,7 @@
           <a:p>
             <a:fld id="{EC310068-050D-EA44-BCC5-73AE705BEFFB}" type="datetimeFigureOut">
               <a:rPr lang="en-US" smtClean="0"/>
-              <a:t>8/18/23</a:t>
+              <a:t>11/10/23</a:t>
             </a:fld>
             <a:endParaRPr lang="en-US"/>
           </a:p>
@@ -2069,7 +2070,7 @@
           <a:p>
             <a:fld id="{EC310068-050D-EA44-BCC5-73AE705BEFFB}" type="datetimeFigureOut">
               <a:rPr lang="en-US" smtClean="0"/>
-              <a:t>8/18/23</a:t>
+              <a:t>11/10/23</a:t>
             </a:fld>
             <a:endParaRPr lang="en-US"/>
           </a:p>
@@ -2380,7 +2381,7 @@
           <a:p>
             <a:fld id="{EC310068-050D-EA44-BCC5-73AE705BEFFB}" type="datetimeFigureOut">
               <a:rPr lang="en-US" smtClean="0"/>
-              <a:t>8/18/23</a:t>
+              <a:t>11/10/23</a:t>
             </a:fld>
             <a:endParaRPr lang="en-US"/>
           </a:p>
@@ -2668,7 +2669,7 @@
           <a:p>
             <a:fld id="{EC310068-050D-EA44-BCC5-73AE705BEFFB}" type="datetimeFigureOut">
               <a:rPr lang="en-US" smtClean="0"/>
-              <a:t>8/18/23</a:t>
+              <a:t>11/10/23</a:t>
             </a:fld>
             <a:endParaRPr lang="en-US"/>
           </a:p>
@@ -2909,7 +2910,7 @@
           <a:p>
             <a:fld id="{EC310068-050D-EA44-BCC5-73AE705BEFFB}" type="datetimeFigureOut">
               <a:rPr lang="en-US" smtClean="0"/>
-              <a:t>8/18/23</a:t>
+              <a:t>11/10/23</a:t>
             </a:fld>
             <a:endParaRPr lang="en-US"/>
           </a:p>
@@ -3348,7 +3349,7 @@
         <p:spPr>
           <a:xfrm>
             <a:off x="928913" y="-188485"/>
-            <a:ext cx="8055429" cy="7234968"/>
+            <a:ext cx="8055428" cy="7234967"/>
           </a:xfrm>
           <a:prstGeom prst="rect">
             <a:avLst/>
@@ -3357,7 +3358,7 @@
       </p:pic>
       <p:pic>
         <p:nvPicPr>
-          <p:cNvPr id="7" name="Picture 6" descr="A map of the island&#10;&#10;Description automatically generated">
+          <p:cNvPr id="7" name="Picture 6">
             <a:extLst>
               <a:ext uri="{FF2B5EF4-FFF2-40B4-BE49-F238E27FC236}">
                 <a16:creationId xmlns:a16="http://schemas.microsoft.com/office/drawing/2014/main" id="{A1D0C370-0E09-7A71-0008-E9EE05C8A35D}"/>
@@ -3371,7 +3372,7 @@
         </p:nvPicPr>
         <p:blipFill rotWithShape="1">
           <a:blip r:embed="rId3"/>
-          <a:srcRect l="6417" t="2626" r="10883" b="11339"/>
+          <a:srcRect l="10288" t="11133" r="15393" b="25792"/>
           <a:stretch/>
         </p:blipFill>
         <p:spPr>
@@ -3389,10 +3390,167 @@
           </a:ln>
         </p:spPr>
       </p:pic>
+      <p:sp>
+        <p:nvSpPr>
+          <p:cNvPr id="2" name="TextBox 1">
+            <a:extLst>
+              <a:ext uri="{FF2B5EF4-FFF2-40B4-BE49-F238E27FC236}">
+                <a16:creationId xmlns:a16="http://schemas.microsoft.com/office/drawing/2014/main" id="{4106B5FF-336E-4A65-6825-27B80DC976D7}"/>
+              </a:ext>
+            </a:extLst>
+          </p:cNvPr>
+          <p:cNvSpPr txBox="1"/>
+          <p:nvPr/>
+        </p:nvSpPr>
+        <p:spPr>
+          <a:xfrm>
+            <a:off x="7342214" y="6258996"/>
+            <a:ext cx="1286933" cy="338554"/>
+          </a:xfrm>
+          <a:prstGeom prst="rect">
+            <a:avLst/>
+          </a:prstGeom>
+          <a:noFill/>
+        </p:spPr>
+        <p:txBody>
+          <a:bodyPr wrap="square" rtlCol="0">
+            <a:spAutoFit/>
+          </a:bodyPr>
+          <a:lstStyle/>
+          <a:p>
+            <a:r>
+              <a:rPr lang="en-US" sz="1600" dirty="0">
+                <a:latin typeface="Arial" panose="020B0604020202020204" pitchFamily="34" charset="0"/>
+                <a:cs typeface="Arial" panose="020B0604020202020204" pitchFamily="34" charset="0"/>
+              </a:rPr>
+              <a:t>Isle Au Haut</a:t>
+            </a:r>
+          </a:p>
+        </p:txBody>
+      </p:sp>
+      <p:pic>
+        <p:nvPicPr>
+          <p:cNvPr id="4" name="Picture 3" descr="A black background with a black square&#10;&#10;Description automatically generated with medium confidence">
+            <a:extLst>
+              <a:ext uri="{FF2B5EF4-FFF2-40B4-BE49-F238E27FC236}">
+                <a16:creationId xmlns:a16="http://schemas.microsoft.com/office/drawing/2014/main" id="{22C577F1-9B0A-1E93-2461-E4E21CD1026A}"/>
+              </a:ext>
+            </a:extLst>
+          </p:cNvPr>
+          <p:cNvPicPr>
+            <a:picLocks noChangeAspect="1"/>
+          </p:cNvPicPr>
+          <p:nvPr/>
+        </p:nvPicPr>
+        <p:blipFill>
+          <a:blip r:embed="rId4"/>
+          <a:stretch>
+            <a:fillRect/>
+          </a:stretch>
+        </p:blipFill>
+        <p:spPr>
+          <a:xfrm>
+            <a:off x="7717422" y="3189065"/>
+            <a:ext cx="1096377" cy="1395389"/>
+          </a:xfrm>
+          <a:prstGeom prst="rect">
+            <a:avLst/>
+          </a:prstGeom>
+        </p:spPr>
+      </p:pic>
     </p:spTree>
     <p:extLst>
       <p:ext uri="{BB962C8B-B14F-4D97-AF65-F5344CB8AC3E}">
         <p14:creationId xmlns:p14="http://schemas.microsoft.com/office/powerpoint/2010/main" val="1694239359"/>
+      </p:ext>
+    </p:extLst>
+  </p:cSld>
+  <p:clrMapOvr>
+    <a:masterClrMapping/>
+  </p:clrMapOvr>
+</p:sld>
+</file>
+
+<file path=ppt/slides/slide2.xml><?xml version="1.0" encoding="utf-8"?>
+<p:sld xmlns:a="http://schemas.openxmlformats.org/drawingml/2006/main" xmlns:r="http://schemas.openxmlformats.org/officeDocument/2006/relationships" xmlns:p="http://schemas.openxmlformats.org/presentationml/2006/main">
+  <p:cSld>
+    <p:spTree>
+      <p:nvGrpSpPr>
+        <p:cNvPr id="1" name=""/>
+        <p:cNvGrpSpPr/>
+        <p:nvPr/>
+      </p:nvGrpSpPr>
+      <p:grpSpPr>
+        <a:xfrm>
+          <a:off x="0" y="0"/>
+          <a:ext cx="0" cy="0"/>
+          <a:chOff x="0" y="0"/>
+          <a:chExt cx="0" cy="0"/>
+        </a:xfrm>
+      </p:grpSpPr>
+      <p:pic>
+        <p:nvPicPr>
+          <p:cNvPr id="7" name="Picture 6">
+            <a:extLst>
+              <a:ext uri="{FF2B5EF4-FFF2-40B4-BE49-F238E27FC236}">
+                <a16:creationId xmlns:a16="http://schemas.microsoft.com/office/drawing/2014/main" id="{DBBF4144-FE7F-C9D9-6920-279B632688D1}"/>
+              </a:ext>
+            </a:extLst>
+          </p:cNvPr>
+          <p:cNvPicPr>
+            <a:picLocks noChangeAspect="1"/>
+          </p:cNvPicPr>
+          <p:nvPr/>
+        </p:nvPicPr>
+        <p:blipFill>
+          <a:blip r:embed="rId2"/>
+          <a:srcRect/>
+          <a:stretch/>
+        </p:blipFill>
+        <p:spPr>
+          <a:xfrm>
+            <a:off x="2278144" y="0"/>
+            <a:ext cx="7635711" cy="6858000"/>
+          </a:xfrm>
+          <a:prstGeom prst="rect">
+            <a:avLst/>
+          </a:prstGeom>
+        </p:spPr>
+      </p:pic>
+      <p:pic>
+        <p:nvPicPr>
+          <p:cNvPr id="9" name="Picture 8" descr="A black background with a black square&#10;&#10;Description automatically generated with medium confidence">
+            <a:extLst>
+              <a:ext uri="{FF2B5EF4-FFF2-40B4-BE49-F238E27FC236}">
+                <a16:creationId xmlns:a16="http://schemas.microsoft.com/office/drawing/2014/main" id="{CCB78E88-7379-C0EA-FE74-E8CB58B6C1C7}"/>
+              </a:ext>
+            </a:extLst>
+          </p:cNvPr>
+          <p:cNvPicPr>
+            <a:picLocks noChangeAspect="1"/>
+          </p:cNvPicPr>
+          <p:nvPr/>
+        </p:nvPicPr>
+        <p:blipFill>
+          <a:blip r:embed="rId3"/>
+          <a:stretch>
+            <a:fillRect/>
+          </a:stretch>
+        </p:blipFill>
+        <p:spPr>
+          <a:xfrm>
+            <a:off x="8506460" y="5418143"/>
+            <a:ext cx="1131316" cy="1439857"/>
+          </a:xfrm>
+          <a:prstGeom prst="rect">
+            <a:avLst/>
+          </a:prstGeom>
+        </p:spPr>
+      </p:pic>
+    </p:spTree>
+    <p:extLst>
+      <p:ext uri="{BB962C8B-B14F-4D97-AF65-F5344CB8AC3E}">
+        <p14:creationId xmlns:p14="http://schemas.microsoft.com/office/powerpoint/2010/main" val="3110280460"/>
       </p:ext>
     </p:extLst>
   </p:cSld>

</xml_diff>

<commit_message>
new spatial stats and maps for KAWW and ACAD
</commit_message>
<xml_diff>
--- a/outputs/forpub/z_old_versions/heatmap_final.pptx
+++ b/outputs/forpub/z_old_versions/heatmap_final.pptx
@@ -260,7 +260,7 @@
           <a:p>
             <a:fld id="{EC310068-050D-EA44-BCC5-73AE705BEFFB}" type="datetimeFigureOut">
               <a:rPr lang="en-US" smtClean="0"/>
-              <a:t>11/10/23</a:t>
+              <a:t>11/20/23</a:t>
             </a:fld>
             <a:endParaRPr lang="en-US"/>
           </a:p>
@@ -458,7 +458,7 @@
           <a:p>
             <a:fld id="{EC310068-050D-EA44-BCC5-73AE705BEFFB}" type="datetimeFigureOut">
               <a:rPr lang="en-US" smtClean="0"/>
-              <a:t>11/10/23</a:t>
+              <a:t>11/20/23</a:t>
             </a:fld>
             <a:endParaRPr lang="en-US"/>
           </a:p>
@@ -666,7 +666,7 @@
           <a:p>
             <a:fld id="{EC310068-050D-EA44-BCC5-73AE705BEFFB}" type="datetimeFigureOut">
               <a:rPr lang="en-US" smtClean="0"/>
-              <a:t>11/10/23</a:t>
+              <a:t>11/20/23</a:t>
             </a:fld>
             <a:endParaRPr lang="en-US"/>
           </a:p>
@@ -864,7 +864,7 @@
           <a:p>
             <a:fld id="{EC310068-050D-EA44-BCC5-73AE705BEFFB}" type="datetimeFigureOut">
               <a:rPr lang="en-US" smtClean="0"/>
-              <a:t>11/10/23</a:t>
+              <a:t>11/20/23</a:t>
             </a:fld>
             <a:endParaRPr lang="en-US"/>
           </a:p>
@@ -1139,7 +1139,7 @@
           <a:p>
             <a:fld id="{EC310068-050D-EA44-BCC5-73AE705BEFFB}" type="datetimeFigureOut">
               <a:rPr lang="en-US" smtClean="0"/>
-              <a:t>11/10/23</a:t>
+              <a:t>11/20/23</a:t>
             </a:fld>
             <a:endParaRPr lang="en-US"/>
           </a:p>
@@ -1404,7 +1404,7 @@
           <a:p>
             <a:fld id="{EC310068-050D-EA44-BCC5-73AE705BEFFB}" type="datetimeFigureOut">
               <a:rPr lang="en-US" smtClean="0"/>
-              <a:t>11/10/23</a:t>
+              <a:t>11/20/23</a:t>
             </a:fld>
             <a:endParaRPr lang="en-US"/>
           </a:p>
@@ -1816,7 +1816,7 @@
           <a:p>
             <a:fld id="{EC310068-050D-EA44-BCC5-73AE705BEFFB}" type="datetimeFigureOut">
               <a:rPr lang="en-US" smtClean="0"/>
-              <a:t>11/10/23</a:t>
+              <a:t>11/20/23</a:t>
             </a:fld>
             <a:endParaRPr lang="en-US"/>
           </a:p>
@@ -1957,7 +1957,7 @@
           <a:p>
             <a:fld id="{EC310068-050D-EA44-BCC5-73AE705BEFFB}" type="datetimeFigureOut">
               <a:rPr lang="en-US" smtClean="0"/>
-              <a:t>11/10/23</a:t>
+              <a:t>11/20/23</a:t>
             </a:fld>
             <a:endParaRPr lang="en-US"/>
           </a:p>
@@ -2070,7 +2070,7 @@
           <a:p>
             <a:fld id="{EC310068-050D-EA44-BCC5-73AE705BEFFB}" type="datetimeFigureOut">
               <a:rPr lang="en-US" smtClean="0"/>
-              <a:t>11/10/23</a:t>
+              <a:t>11/20/23</a:t>
             </a:fld>
             <a:endParaRPr lang="en-US"/>
           </a:p>
@@ -2381,7 +2381,7 @@
           <a:p>
             <a:fld id="{EC310068-050D-EA44-BCC5-73AE705BEFFB}" type="datetimeFigureOut">
               <a:rPr lang="en-US" smtClean="0"/>
-              <a:t>11/10/23</a:t>
+              <a:t>11/20/23</a:t>
             </a:fld>
             <a:endParaRPr lang="en-US"/>
           </a:p>
@@ -2669,7 +2669,7 @@
           <a:p>
             <a:fld id="{EC310068-050D-EA44-BCC5-73AE705BEFFB}" type="datetimeFigureOut">
               <a:rPr lang="en-US" smtClean="0"/>
-              <a:t>11/10/23</a:t>
+              <a:t>11/20/23</a:t>
             </a:fld>
             <a:endParaRPr lang="en-US"/>
           </a:p>
@@ -2910,7 +2910,7 @@
           <a:p>
             <a:fld id="{EC310068-050D-EA44-BCC5-73AE705BEFFB}" type="datetimeFigureOut">
               <a:rPr lang="en-US" smtClean="0"/>
-              <a:t>11/10/23</a:t>
+              <a:t>11/20/23</a:t>
             </a:fld>
             <a:endParaRPr lang="en-US"/>
           </a:p>
@@ -3349,7 +3349,7 @@
         <p:spPr>
           <a:xfrm>
             <a:off x="928913" y="-188485"/>
-            <a:ext cx="8055428" cy="7234967"/>
+            <a:ext cx="8055427" cy="7234967"/>
           </a:xfrm>
           <a:prstGeom prst="rect">
             <a:avLst/>
@@ -3372,7 +3372,7 @@
         </p:nvPicPr>
         <p:blipFill rotWithShape="1">
           <a:blip r:embed="rId3"/>
-          <a:srcRect l="10288" t="11133" r="15393" b="25792"/>
+          <a:srcRect l="13491" t="11549" r="9411" b="23020"/>
           <a:stretch/>
         </p:blipFill>
         <p:spPr>
@@ -3510,7 +3510,7 @@
         <p:spPr>
           <a:xfrm>
             <a:off x="2278144" y="0"/>
-            <a:ext cx="7635711" cy="6858000"/>
+            <a:ext cx="7635711" cy="6857999"/>
           </a:xfrm>
           <a:prstGeom prst="rect">
             <a:avLst/>

</xml_diff>